<commit_message>
modify export event sequence diagram
</commit_message>
<xml_diff>
--- a/docs/diagrams/ExportEventSequenceDiagram.pptx
+++ b/docs/diagrams/ExportEventSequenceDiagram.pptx
@@ -208,7 +208,7 @@
           <a:p>
             <a:fld id="{F5CC4B3F-88C1-4FFA-B1B6-F41C21DC6924}" type="datetimeFigureOut">
               <a:rPr lang="en-US" smtClean="0"/>
-              <a:t>3/21/18</a:t>
+              <a:t>4/14/18</a:t>
             </a:fld>
             <a:endParaRPr lang="en-US"/>
           </a:p>
@@ -654,7 +654,7 @@
           <a:p>
             <a:fld id="{78C97017-6FC3-485B-9764-EAC9E56C1D49}" type="datetimeFigureOut">
               <a:rPr lang="en-US" smtClean="0"/>
-              <a:t>3/21/18</a:t>
+              <a:t>4/14/18</a:t>
             </a:fld>
             <a:endParaRPr lang="en-US"/>
           </a:p>
@@ -822,7 +822,7 @@
           <a:p>
             <a:fld id="{78C97017-6FC3-485B-9764-EAC9E56C1D49}" type="datetimeFigureOut">
               <a:rPr lang="en-US" smtClean="0"/>
-              <a:t>3/21/18</a:t>
+              <a:t>4/14/18</a:t>
             </a:fld>
             <a:endParaRPr lang="en-US"/>
           </a:p>
@@ -1000,7 +1000,7 @@
           <a:p>
             <a:fld id="{78C97017-6FC3-485B-9764-EAC9E56C1D49}" type="datetimeFigureOut">
               <a:rPr lang="en-US" smtClean="0"/>
-              <a:t>3/21/18</a:t>
+              <a:t>4/14/18</a:t>
             </a:fld>
             <a:endParaRPr lang="en-US"/>
           </a:p>
@@ -1168,7 +1168,7 @@
           <a:p>
             <a:fld id="{78C97017-6FC3-485B-9764-EAC9E56C1D49}" type="datetimeFigureOut">
               <a:rPr lang="en-US" smtClean="0"/>
-              <a:t>3/21/18</a:t>
+              <a:t>4/14/18</a:t>
             </a:fld>
             <a:endParaRPr lang="en-US"/>
           </a:p>
@@ -1413,7 +1413,7 @@
           <a:p>
             <a:fld id="{78C97017-6FC3-485B-9764-EAC9E56C1D49}" type="datetimeFigureOut">
               <a:rPr lang="en-US" smtClean="0"/>
-              <a:t>3/21/18</a:t>
+              <a:t>4/14/18</a:t>
             </a:fld>
             <a:endParaRPr lang="en-US"/>
           </a:p>
@@ -1698,7 +1698,7 @@
           <a:p>
             <a:fld id="{78C97017-6FC3-485B-9764-EAC9E56C1D49}" type="datetimeFigureOut">
               <a:rPr lang="en-US" smtClean="0"/>
-              <a:t>3/21/18</a:t>
+              <a:t>4/14/18</a:t>
             </a:fld>
             <a:endParaRPr lang="en-US"/>
           </a:p>
@@ -2117,7 +2117,7 @@
           <a:p>
             <a:fld id="{78C97017-6FC3-485B-9764-EAC9E56C1D49}" type="datetimeFigureOut">
               <a:rPr lang="en-US" smtClean="0"/>
-              <a:t>3/21/18</a:t>
+              <a:t>4/14/18</a:t>
             </a:fld>
             <a:endParaRPr lang="en-US"/>
           </a:p>
@@ -2234,7 +2234,7 @@
           <a:p>
             <a:fld id="{78C97017-6FC3-485B-9764-EAC9E56C1D49}" type="datetimeFigureOut">
               <a:rPr lang="en-US" smtClean="0"/>
-              <a:t>3/21/18</a:t>
+              <a:t>4/14/18</a:t>
             </a:fld>
             <a:endParaRPr lang="en-US"/>
           </a:p>
@@ -2329,7 +2329,7 @@
           <a:p>
             <a:fld id="{78C97017-6FC3-485B-9764-EAC9E56C1D49}" type="datetimeFigureOut">
               <a:rPr lang="en-US" smtClean="0"/>
-              <a:t>3/21/18</a:t>
+              <a:t>4/14/18</a:t>
             </a:fld>
             <a:endParaRPr lang="en-US"/>
           </a:p>
@@ -2604,7 +2604,7 @@
           <a:p>
             <a:fld id="{78C97017-6FC3-485B-9764-EAC9E56C1D49}" type="datetimeFigureOut">
               <a:rPr lang="en-US" smtClean="0"/>
-              <a:t>3/21/18</a:t>
+              <a:t>4/14/18</a:t>
             </a:fld>
             <a:endParaRPr lang="en-US"/>
           </a:p>
@@ -2856,7 +2856,7 @@
           <a:p>
             <a:fld id="{78C97017-6FC3-485B-9764-EAC9E56C1D49}" type="datetimeFigureOut">
               <a:rPr lang="en-US" smtClean="0"/>
-              <a:t>3/21/18</a:t>
+              <a:t>4/14/18</a:t>
             </a:fld>
             <a:endParaRPr lang="en-US"/>
           </a:p>
@@ -3067,7 +3067,7 @@
           <a:p>
             <a:fld id="{78C97017-6FC3-485B-9764-EAC9E56C1D49}" type="datetimeFigureOut">
               <a:rPr lang="en-US" smtClean="0"/>
-              <a:t>3/21/18</a:t>
+              <a:t>4/14/18</a:t>
             </a:fld>
             <a:endParaRPr lang="en-US"/>
           </a:p>
@@ -3450,8 +3450,8 @@
         </p:nvSpPr>
         <p:spPr>
           <a:xfrm>
-            <a:off x="232829" y="228600"/>
-            <a:ext cx="7996771" cy="4343400"/>
+            <a:off x="461429" y="106784"/>
+            <a:ext cx="7996771" cy="4160416"/>
           </a:xfrm>
           <a:prstGeom prst="roundRect">
             <a:avLst>
@@ -3511,7 +3511,7 @@
         </p:nvSpPr>
         <p:spPr>
           <a:xfrm>
-            <a:off x="883145" y="543946"/>
+            <a:off x="1111745" y="543946"/>
             <a:ext cx="1631455" cy="346760"/>
           </a:xfrm>
           <a:prstGeom prst="rect">
@@ -3588,8 +3588,8 @@
         </p:nvCxnSpPr>
         <p:spPr>
           <a:xfrm>
-            <a:off x="1610959" y="907617"/>
-            <a:ext cx="0" cy="3481399"/>
+            <a:off x="1839559" y="907617"/>
+            <a:ext cx="8518" cy="2902383"/>
           </a:xfrm>
           <a:prstGeom prst="line">
             <a:avLst/>
@@ -3625,8 +3625,8 @@
         </p:nvSpPr>
         <p:spPr>
           <a:xfrm>
-            <a:off x="1538951" y="1258311"/>
-            <a:ext cx="152400" cy="2932689"/>
+            <a:off x="1776203" y="1258311"/>
+            <a:ext cx="143748" cy="2018289"/>
           </a:xfrm>
           <a:prstGeom prst="rect">
             <a:avLst/>
@@ -3672,7 +3672,7 @@
         </p:nvSpPr>
         <p:spPr>
           <a:xfrm>
-            <a:off x="2992897" y="540742"/>
+            <a:off x="3221497" y="540742"/>
             <a:ext cx="2263145" cy="348980"/>
           </a:xfrm>
           <a:prstGeom prst="rect">
@@ -3741,8 +3741,8 @@
         </p:nvCxnSpPr>
         <p:spPr>
           <a:xfrm>
-            <a:off x="4037610" y="907617"/>
-            <a:ext cx="24905" cy="3435783"/>
+            <a:off x="4266210" y="907617"/>
+            <a:ext cx="1808" cy="2902383"/>
           </a:xfrm>
           <a:prstGeom prst="line">
             <a:avLst/>
@@ -3778,7 +3778,7 @@
         </p:nvSpPr>
         <p:spPr>
           <a:xfrm>
-            <a:off x="3970062" y="2260460"/>
+            <a:off x="4198662" y="2260460"/>
             <a:ext cx="154408" cy="767790"/>
           </a:xfrm>
           <a:prstGeom prst="rect">
@@ -3831,9 +3831,9 @@
           <p:nvPr/>
         </p:nvCxnSpPr>
         <p:spPr>
-          <a:xfrm flipH="1">
-            <a:off x="5593337" y="1578460"/>
-            <a:ext cx="8745" cy="2764940"/>
+          <a:xfrm>
+            <a:off x="5830682" y="1578460"/>
+            <a:ext cx="0" cy="2155340"/>
           </a:xfrm>
           <a:prstGeom prst="line">
             <a:avLst/>
@@ -3869,7 +3869,7 @@
         </p:nvSpPr>
         <p:spPr>
           <a:xfrm>
-            <a:off x="5525882" y="1578460"/>
+            <a:off x="5754482" y="1578460"/>
             <a:ext cx="152400" cy="276003"/>
           </a:xfrm>
           <a:prstGeom prst="rect">
@@ -3911,13 +3911,15 @@
       <p:cxnSp>
         <p:nvCxnSpPr>
           <p:cNvPr id="23" name="Straight Arrow Connector 22"/>
-          <p:cNvCxnSpPr/>
+          <p:cNvCxnSpPr>
+            <a:cxnSpLocks/>
+          </p:cNvCxnSpPr>
           <p:nvPr/>
         </p:nvCxnSpPr>
         <p:spPr>
-          <a:xfrm>
-            <a:off x="419100" y="1261999"/>
-            <a:ext cx="1119851" cy="0"/>
+          <a:xfrm flipV="1">
+            <a:off x="228600" y="1261999"/>
+            <a:ext cx="1538951" cy="8724"/>
           </a:xfrm>
           <a:prstGeom prst="straightConnector1">
             <a:avLst/>
@@ -4015,7 +4017,7 @@
         </p:nvSpPr>
         <p:spPr>
           <a:xfrm>
-            <a:off x="2389317" y="2018050"/>
+            <a:off x="2617917" y="2018050"/>
             <a:ext cx="855809" cy="215444"/>
           </a:xfrm>
           <a:prstGeom prst="rect">
@@ -4061,7 +4063,7 @@
         </p:nvCxnSpPr>
         <p:spPr>
           <a:xfrm>
-            <a:off x="1691351" y="1676400"/>
+            <a:off x="1919951" y="1676400"/>
             <a:ext cx="2348067" cy="0"/>
           </a:xfrm>
           <a:prstGeom prst="straightConnector1">
@@ -4099,7 +4101,7 @@
         </p:nvSpPr>
         <p:spPr>
           <a:xfrm>
-            <a:off x="5525882" y="2359236"/>
+            <a:off x="5754482" y="2359236"/>
             <a:ext cx="161180" cy="530286"/>
           </a:xfrm>
           <a:prstGeom prst="rect">
@@ -4148,7 +4150,7 @@
         </p:nvCxnSpPr>
         <p:spPr>
           <a:xfrm>
-            <a:off x="5678282" y="2449977"/>
+            <a:off x="5906882" y="2449977"/>
             <a:ext cx="1510983" cy="0"/>
           </a:xfrm>
           <a:prstGeom prst="straightConnector1">
@@ -4184,7 +4186,7 @@
         </p:nvSpPr>
         <p:spPr>
           <a:xfrm>
-            <a:off x="4295591" y="2118130"/>
+            <a:off x="4524191" y="2118130"/>
             <a:ext cx="1046123" cy="184666"/>
           </a:xfrm>
           <a:prstGeom prst="rect">
@@ -4230,7 +4232,7 @@
         </p:nvCxnSpPr>
         <p:spPr>
           <a:xfrm>
-            <a:off x="5676773" y="2790103"/>
+            <a:off x="5905373" y="2790103"/>
             <a:ext cx="1512492" cy="0"/>
           </a:xfrm>
           <a:prstGeom prst="straightConnector1">
@@ -4268,7 +4270,7 @@
         </p:nvSpPr>
         <p:spPr>
           <a:xfrm>
-            <a:off x="6638159" y="1726117"/>
+            <a:off x="6866759" y="1726117"/>
             <a:ext cx="1286641" cy="304668"/>
           </a:xfrm>
           <a:prstGeom prst="rect">
@@ -4337,8 +4339,8 @@
         </p:nvCxnSpPr>
         <p:spPr>
           <a:xfrm>
-            <a:off x="7265465" y="2305554"/>
-            <a:ext cx="0" cy="2037846"/>
+            <a:off x="7494065" y="2305554"/>
+            <a:ext cx="0" cy="1504446"/>
           </a:xfrm>
           <a:prstGeom prst="line">
             <a:avLst/>
@@ -4374,7 +4376,7 @@
         </p:nvSpPr>
         <p:spPr>
           <a:xfrm>
-            <a:off x="7189266" y="2438400"/>
+            <a:off x="7417866" y="2438400"/>
             <a:ext cx="152400" cy="351475"/>
           </a:xfrm>
           <a:prstGeom prst="rect">
@@ -4423,7 +4425,7 @@
         </p:nvCxnSpPr>
         <p:spPr>
           <a:xfrm>
-            <a:off x="4120482" y="2359236"/>
+            <a:off x="4349082" y="2359236"/>
             <a:ext cx="1405400" cy="0"/>
           </a:xfrm>
           <a:prstGeom prst="straightConnector1">
@@ -4459,7 +4461,7 @@
         </p:nvSpPr>
         <p:spPr>
           <a:xfrm>
-            <a:off x="4804375" y="1271033"/>
+            <a:off x="5032975" y="1271033"/>
             <a:ext cx="1577924" cy="335622"/>
           </a:xfrm>
           <a:prstGeom prst="rect">
@@ -4534,7 +4536,7 @@
         </p:nvCxnSpPr>
         <p:spPr>
           <a:xfrm>
-            <a:off x="1703041" y="2255470"/>
+            <a:off x="1931641" y="2255470"/>
             <a:ext cx="2287229" cy="9981"/>
           </a:xfrm>
           <a:prstGeom prst="straightConnector1">
@@ -4578,7 +4580,7 @@
         </p:nvCxnSpPr>
         <p:spPr>
           <a:xfrm>
-            <a:off x="1708245" y="1295399"/>
+            <a:off x="1936845" y="1295399"/>
             <a:ext cx="2282025" cy="0"/>
           </a:xfrm>
           <a:prstGeom prst="straightConnector1">
@@ -4622,7 +4624,7 @@
         </p:nvCxnSpPr>
         <p:spPr>
           <a:xfrm>
-            <a:off x="1691351" y="3025408"/>
+            <a:off x="1919951" y="3025408"/>
             <a:ext cx="2270059" cy="0"/>
           </a:xfrm>
           <a:prstGeom prst="straightConnector1">
@@ -4668,7 +4670,7 @@
         </p:nvCxnSpPr>
         <p:spPr>
           <a:xfrm>
-            <a:off x="4120482" y="2889522"/>
+            <a:off x="4349082" y="2889522"/>
             <a:ext cx="1405400" cy="0"/>
           </a:xfrm>
           <a:prstGeom prst="straightConnector1">
@@ -4712,7 +4714,7 @@
         </p:nvSpPr>
         <p:spPr>
           <a:xfrm>
-            <a:off x="3970062" y="804064"/>
+            <a:off x="4198662" y="804064"/>
             <a:ext cx="152400" cy="276003"/>
           </a:xfrm>
           <a:prstGeom prst="rect">
@@ -4765,7 +4767,7 @@
         </p:nvSpPr>
         <p:spPr>
           <a:xfrm>
-            <a:off x="3970062" y="1270723"/>
+            <a:off x="4198662" y="1270723"/>
             <a:ext cx="150420" cy="388414"/>
           </a:xfrm>
           <a:prstGeom prst="rect">
@@ -4818,7 +4820,7 @@
         </p:nvSpPr>
         <p:spPr>
           <a:xfrm>
-            <a:off x="7189265" y="2009997"/>
+            <a:off x="7417865" y="2009997"/>
             <a:ext cx="152400" cy="276003"/>
           </a:xfrm>
           <a:prstGeom prst="rect">
@@ -4871,7 +4873,7 @@
         </p:nvSpPr>
         <p:spPr>
           <a:xfrm>
-            <a:off x="5802084" y="2233494"/>
+            <a:off x="6030684" y="2233494"/>
             <a:ext cx="1046123" cy="184666"/>
           </a:xfrm>
           <a:prstGeom prst="rect">
@@ -4907,6 +4909,53 @@
           </a:p>
         </p:txBody>
       </p:sp>
+      <p:cxnSp>
+        <p:nvCxnSpPr>
+          <p:cNvPr id="32" name="Straight Arrow Connector 31">
+            <a:extLst>
+              <a:ext uri="{FF2B5EF4-FFF2-40B4-BE49-F238E27FC236}">
+                <a16:creationId xmlns:a16="http://schemas.microsoft.com/office/drawing/2014/main" id="{05FD2EB2-418C-004F-A738-4970B34A1FD9}"/>
+              </a:ext>
+            </a:extLst>
+          </p:cNvPr>
+          <p:cNvCxnSpPr>
+            <a:cxnSpLocks/>
+            <a:endCxn id="6" idx="2"/>
+          </p:cNvCxnSpPr>
+          <p:nvPr/>
+        </p:nvCxnSpPr>
+        <p:spPr>
+          <a:xfrm>
+            <a:off x="228600" y="3276600"/>
+            <a:ext cx="1619477" cy="0"/>
+          </a:xfrm>
+          <a:prstGeom prst="straightConnector1">
+            <a:avLst/>
+          </a:prstGeom>
+          <a:ln w="19050">
+            <a:solidFill>
+              <a:srgbClr val="0070C0"/>
+            </a:solidFill>
+            <a:prstDash val="sysDash"/>
+            <a:headEnd type="arrow" w="med" len="med"/>
+            <a:tailEnd type="none" w="med" len="med"/>
+          </a:ln>
+        </p:spPr>
+        <p:style>
+          <a:lnRef idx="1">
+            <a:schemeClr val="accent1"/>
+          </a:lnRef>
+          <a:fillRef idx="0">
+            <a:schemeClr val="accent1"/>
+          </a:fillRef>
+          <a:effectRef idx="0">
+            <a:schemeClr val="accent1"/>
+          </a:effectRef>
+          <a:fontRef idx="minor">
+            <a:schemeClr val="tx1"/>
+          </a:fontRef>
+        </p:style>
+      </p:cxnSp>
     </p:spTree>
     <p:extLst>
       <p:ext uri="{BB962C8B-B14F-4D97-AF65-F5344CB8AC3E}">

</xml_diff>